<commit_message>
ppt & added packages
</commit_message>
<xml_diff>
--- a/doc/allout.pptx
+++ b/doc/allout.pptx
@@ -287,7 +287,7 @@
             <a:fld id="{87DE6118-2437-4B30-8E3C-4D2BE6020583}" type="datetimeFigureOut">
               <a:rPr lang="en-US" dirty="0"/>
               <a:pPr/>
-              <a:t>10/4/2018</a:t>
+              <a:t>10/21/2018</a:t>
             </a:fld>
             <a:endParaRPr lang="en-US" dirty="0"/>
           </a:p>
@@ -613,7 +613,7 @@
           <a:p>
             <a:fld id="{87DE6118-2437-4B30-8E3C-4D2BE6020583}" type="datetimeFigureOut">
               <a:rPr lang="en-US" dirty="0"/>
-              <a:t>10/4/2018</a:t>
+              <a:t>10/21/2018</a:t>
             </a:fld>
             <a:endParaRPr lang="en-US" dirty="0"/>
           </a:p>
@@ -788,7 +788,7 @@
           <a:p>
             <a:fld id="{87DE6118-2437-4B30-8E3C-4D2BE6020583}" type="datetimeFigureOut">
               <a:rPr lang="en-US" dirty="0"/>
-              <a:t>10/4/2018</a:t>
+              <a:t>10/21/2018</a:t>
             </a:fld>
             <a:endParaRPr lang="en-US" dirty="0"/>
           </a:p>
@@ -953,7 +953,7 @@
           <a:p>
             <a:fld id="{87DE6118-2437-4B30-8E3C-4D2BE6020583}" type="datetimeFigureOut">
               <a:rPr lang="en-US" dirty="0"/>
-              <a:t>10/4/2018</a:t>
+              <a:t>10/21/2018</a:t>
             </a:fld>
             <a:endParaRPr lang="en-US" dirty="0"/>
           </a:p>
@@ -1226,7 +1226,7 @@
             <a:fld id="{87DE6118-2437-4B30-8E3C-4D2BE6020583}" type="datetimeFigureOut">
               <a:rPr lang="en-US" dirty="0"/>
               <a:pPr/>
-              <a:t>10/4/2018</a:t>
+              <a:t>10/21/2018</a:t>
             </a:fld>
             <a:endParaRPr lang="en-US" dirty="0"/>
           </a:p>
@@ -1616,7 +1616,7 @@
           <a:p>
             <a:fld id="{87DE6118-2437-4B30-8E3C-4D2BE6020583}" type="datetimeFigureOut">
               <a:rPr lang="en-US" dirty="0"/>
-              <a:t>10/4/2018</a:t>
+              <a:t>10/21/2018</a:t>
             </a:fld>
             <a:endParaRPr lang="en-US" dirty="0"/>
           </a:p>
@@ -2088,7 +2088,7 @@
           <a:p>
             <a:fld id="{87DE6118-2437-4B30-8E3C-4D2BE6020583}" type="datetimeFigureOut">
               <a:rPr lang="en-US" dirty="0"/>
-              <a:t>10/4/2018</a:t>
+              <a:t>10/21/2018</a:t>
             </a:fld>
             <a:endParaRPr lang="en-US" dirty="0"/>
           </a:p>
@@ -2201,7 +2201,7 @@
           <a:p>
             <a:fld id="{87DE6118-2437-4B30-8E3C-4D2BE6020583}" type="datetimeFigureOut">
               <a:rPr lang="en-US" dirty="0"/>
-              <a:t>10/4/2018</a:t>
+              <a:t>10/21/2018</a:t>
             </a:fld>
             <a:endParaRPr lang="en-US" dirty="0"/>
           </a:p>
@@ -2291,7 +2291,7 @@
           <a:p>
             <a:fld id="{87DE6118-2437-4B30-8E3C-4D2BE6020583}" type="datetimeFigureOut">
               <a:rPr lang="en-US" dirty="0"/>
-              <a:t>10/4/2018</a:t>
+              <a:t>10/21/2018</a:t>
             </a:fld>
             <a:endParaRPr lang="en-US" dirty="0"/>
           </a:p>
@@ -2633,7 +2633,7 @@
             <a:fld id="{87DE6118-2437-4B30-8E3C-4D2BE6020583}" type="datetimeFigureOut">
               <a:rPr lang="en-US" dirty="0"/>
               <a:pPr/>
-              <a:t>10/4/2018</a:t>
+              <a:t>10/21/2018</a:t>
             </a:fld>
             <a:endParaRPr lang="en-US" dirty="0"/>
           </a:p>
@@ -3018,7 +3018,7 @@
             <a:fld id="{87DE6118-2437-4B30-8E3C-4D2BE6020583}" type="datetimeFigureOut">
               <a:rPr lang="en-US" dirty="0"/>
               <a:pPr/>
-              <a:t>10/4/2018</a:t>
+              <a:t>10/21/2018</a:t>
             </a:fld>
             <a:endParaRPr lang="en-US" dirty="0"/>
           </a:p>
@@ -3293,7 +3293,7 @@
             <a:fld id="{87DE6118-2437-4B30-8E3C-4D2BE6020583}" type="datetimeFigureOut">
               <a:rPr lang="en-US" dirty="0"/>
               <a:pPr/>
-              <a:t>10/4/2018</a:t>
+              <a:t>10/21/2018</a:t>
             </a:fld>
             <a:endParaRPr lang="en-US" dirty="0"/>
           </a:p>
@@ -3823,7 +3823,7 @@
           <a:lstStyle/>
           <a:p>
             <a:r>
-              <a:rPr lang="en-US" sz="10000" b="1" dirty="0" err="1">
+              <a:rPr lang="en-US" sz="10000" b="1">
                 <a:solidFill>
                   <a:srgbClr val="C00000"/>
                 </a:solidFill>
@@ -3832,13 +3832,13 @@
               <a:t>aLL</a:t>
             </a:r>
             <a:r>
-              <a:rPr lang="en-US" sz="10000" b="1" dirty="0" err="1">
+              <a:rPr lang="en-US" sz="10000" b="1">
                 <a:latin typeface="Arial Black" panose="020B0A04020102020204" pitchFamily="34" charset="0"/>
               </a:rPr>
               <a:t>OUT</a:t>
             </a:r>
             <a:r>
-              <a:rPr lang="en-US" sz="2400" b="1" dirty="0" err="1">
+              <a:rPr lang="en-US" sz="2400" b="1">
                 <a:solidFill>
                   <a:srgbClr val="C00000"/>
                 </a:solidFill>

</xml_diff>